<commit_message>
partial cleanup on new branch
</commit_message>
<xml_diff>
--- a/documents/FOLDER-ORGANIZATION.pptx
+++ b/documents/FOLDER-ORGANIZATION.pptx
@@ -243,7 +243,7 @@
           <a:p>
             <a:fld id="{B504404D-A543-4C8A-B573-8DD40E3105CD}" type="datetimeFigureOut">
               <a:rPr lang="en-SG" smtClean="0"/>
-              <a:t>14/9/2022</a:t>
+              <a:t>10/10/2022</a:t>
             </a:fld>
             <a:endParaRPr lang="en-SG"/>
           </a:p>
@@ -413,7 +413,7 @@
           <a:p>
             <a:fld id="{B504404D-A543-4C8A-B573-8DD40E3105CD}" type="datetimeFigureOut">
               <a:rPr lang="en-SG" smtClean="0"/>
-              <a:t>14/9/2022</a:t>
+              <a:t>10/10/2022</a:t>
             </a:fld>
             <a:endParaRPr lang="en-SG"/>
           </a:p>
@@ -593,7 +593,7 @@
           <a:p>
             <a:fld id="{B504404D-A543-4C8A-B573-8DD40E3105CD}" type="datetimeFigureOut">
               <a:rPr lang="en-SG" smtClean="0"/>
-              <a:t>14/9/2022</a:t>
+              <a:t>10/10/2022</a:t>
             </a:fld>
             <a:endParaRPr lang="en-SG"/>
           </a:p>
@@ -763,7 +763,7 @@
           <a:p>
             <a:fld id="{B504404D-A543-4C8A-B573-8DD40E3105CD}" type="datetimeFigureOut">
               <a:rPr lang="en-SG" smtClean="0"/>
-              <a:t>14/9/2022</a:t>
+              <a:t>10/10/2022</a:t>
             </a:fld>
             <a:endParaRPr lang="en-SG"/>
           </a:p>
@@ -1007,7 +1007,7 @@
           <a:p>
             <a:fld id="{B504404D-A543-4C8A-B573-8DD40E3105CD}" type="datetimeFigureOut">
               <a:rPr lang="en-SG" smtClean="0"/>
-              <a:t>14/9/2022</a:t>
+              <a:t>10/10/2022</a:t>
             </a:fld>
             <a:endParaRPr lang="en-SG"/>
           </a:p>
@@ -1239,7 +1239,7 @@
           <a:p>
             <a:fld id="{B504404D-A543-4C8A-B573-8DD40E3105CD}" type="datetimeFigureOut">
               <a:rPr lang="en-SG" smtClean="0"/>
-              <a:t>14/9/2022</a:t>
+              <a:t>10/10/2022</a:t>
             </a:fld>
             <a:endParaRPr lang="en-SG"/>
           </a:p>
@@ -1606,7 +1606,7 @@
           <a:p>
             <a:fld id="{B504404D-A543-4C8A-B573-8DD40E3105CD}" type="datetimeFigureOut">
               <a:rPr lang="en-SG" smtClean="0"/>
-              <a:t>14/9/2022</a:t>
+              <a:t>10/10/2022</a:t>
             </a:fld>
             <a:endParaRPr lang="en-SG"/>
           </a:p>
@@ -1724,7 +1724,7 @@
           <a:p>
             <a:fld id="{B504404D-A543-4C8A-B573-8DD40E3105CD}" type="datetimeFigureOut">
               <a:rPr lang="en-SG" smtClean="0"/>
-              <a:t>14/9/2022</a:t>
+              <a:t>10/10/2022</a:t>
             </a:fld>
             <a:endParaRPr lang="en-SG"/>
           </a:p>
@@ -1819,7 +1819,7 @@
           <a:p>
             <a:fld id="{B504404D-A543-4C8A-B573-8DD40E3105CD}" type="datetimeFigureOut">
               <a:rPr lang="en-SG" smtClean="0"/>
-              <a:t>14/9/2022</a:t>
+              <a:t>10/10/2022</a:t>
             </a:fld>
             <a:endParaRPr lang="en-SG"/>
           </a:p>
@@ -2096,7 +2096,7 @@
           <a:p>
             <a:fld id="{B504404D-A543-4C8A-B573-8DD40E3105CD}" type="datetimeFigureOut">
               <a:rPr lang="en-SG" smtClean="0"/>
-              <a:t>14/9/2022</a:t>
+              <a:t>10/10/2022</a:t>
             </a:fld>
             <a:endParaRPr lang="en-SG"/>
           </a:p>
@@ -2353,7 +2353,7 @@
           <a:p>
             <a:fld id="{B504404D-A543-4C8A-B573-8DD40E3105CD}" type="datetimeFigureOut">
               <a:rPr lang="en-SG" smtClean="0"/>
-              <a:t>14/9/2022</a:t>
+              <a:t>10/10/2022</a:t>
             </a:fld>
             <a:endParaRPr lang="en-SG"/>
           </a:p>
@@ -2566,7 +2566,7 @@
           <a:p>
             <a:fld id="{B504404D-A543-4C8A-B573-8DD40E3105CD}" type="datetimeFigureOut">
               <a:rPr lang="en-SG" smtClean="0"/>
-              <a:t>14/9/2022</a:t>
+              <a:t>10/10/2022</a:t>
             </a:fld>
             <a:endParaRPr lang="en-SG"/>
           </a:p>
@@ -2985,8 +2985,8 @@
         </p:nvSpPr>
         <p:spPr>
           <a:xfrm>
-            <a:off x="463640" y="940158"/>
-            <a:ext cx="5898524" cy="1200329"/>
+            <a:off x="405210" y="311945"/>
+            <a:ext cx="5898524" cy="1754326"/>
           </a:xfrm>
           <a:prstGeom prst="rect">
             <a:avLst/>
@@ -3001,7 +3001,23 @@
           <a:p>
             <a:r>
               <a:rPr lang="en-US" dirty="0"/>
-              <a:t>Top-level folders, each one for a dataset, e.g.  indel_set1</a:t>
+              <a:t>The main top-level folders are </a:t>
+            </a:r>
+            <a:r>
+              <a:rPr lang="en-US" dirty="0" err="1"/>
+              <a:t>common_code</a:t>
+            </a:r>
+            <a:r>
+              <a:rPr lang="en-US" dirty="0"/>
+              <a:t>, </a:t>
+            </a:r>
+            <a:r>
+              <a:rPr lang="en-US" dirty="0" err="1"/>
+              <a:t>output_for_paperTop</a:t>
+            </a:r>
+            <a:r>
+              <a:rPr lang="en-US" dirty="0"/>
+              <a:t>-level folders, each one for a dataset, e.g.  indel_set1</a:t>
             </a:r>
           </a:p>
           <a:p>
@@ -3071,7 +3087,7 @@
         <p:spPr>
           <a:xfrm>
             <a:off x="579549" y="3451539"/>
-            <a:ext cx="5903219" cy="646331"/>
+            <a:ext cx="3651897" cy="369332"/>
           </a:xfrm>
           <a:prstGeom prst="rect">
             <a:avLst/>
@@ -3094,15 +3110,8 @@
             </a:r>
             <a:r>
               <a:rPr lang="en-US" dirty="0"/>
-              <a:t>              summary</a:t>
-            </a:r>
-          </a:p>
-          <a:p>
-            <a:r>
-              <a:rPr lang="en-US" dirty="0"/>
-              <a:t>                                                                                (still needed?)</a:t>
-            </a:r>
-            <a:endParaRPr lang="en-SG" dirty="0"/>
+              <a:t>  </a:t>
+            </a:r>
           </a:p>
         </p:txBody>
       </p:sp>

</xml_diff>